<commit_message>
Update Energy Consumption Presentation.pptx
</commit_message>
<xml_diff>
--- a/Energy Consumption Presentation.pptx
+++ b/Energy Consumption Presentation.pptx
@@ -2970,7 +2970,7 @@
             <a:fld id="{B61BEF0D-F0BB-DE4B-95CE-6DB70DBA9567}" type="datetimeFigureOut">
               <a:rPr lang="en-US" dirty="0"/>
               <a:pPr/>
-              <a:t>1/11/21</a:t>
+              <a:t>1/12/21</a:t>
             </a:fld>
             <a:endParaRPr lang="en-US" dirty="0"/>
           </a:p>
@@ -3229,7 +3229,7 @@
             <a:fld id="{B61BEF0D-F0BB-DE4B-95CE-6DB70DBA9567}" type="datetimeFigureOut">
               <a:rPr lang="en-US" dirty="0"/>
               <a:pPr/>
-              <a:t>1/11/21</a:t>
+              <a:t>1/12/21</a:t>
             </a:fld>
             <a:endParaRPr lang="en-US" dirty="0"/>
           </a:p>
@@ -3461,7 +3461,7 @@
             <a:fld id="{B61BEF0D-F0BB-DE4B-95CE-6DB70DBA9567}" type="datetimeFigureOut">
               <a:rPr lang="en-US" dirty="0"/>
               <a:pPr/>
-              <a:t>1/11/21</a:t>
+              <a:t>1/12/21</a:t>
             </a:fld>
             <a:endParaRPr lang="en-US" dirty="0"/>
           </a:p>
@@ -3698,7 +3698,7 @@
             <a:fld id="{B61BEF0D-F0BB-DE4B-95CE-6DB70DBA9567}" type="datetimeFigureOut">
               <a:rPr lang="en-US" dirty="0"/>
               <a:pPr/>
-              <a:t>1/11/21</a:t>
+              <a:t>1/12/21</a:t>
             </a:fld>
             <a:endParaRPr lang="en-US" dirty="0"/>
           </a:p>
@@ -4002,7 +4002,7 @@
             <a:fld id="{B61BEF0D-F0BB-DE4B-95CE-6DB70DBA9567}" type="datetimeFigureOut">
               <a:rPr lang="en-US" dirty="0"/>
               <a:pPr/>
-              <a:t>1/11/21</a:t>
+              <a:t>1/12/21</a:t>
             </a:fld>
             <a:endParaRPr lang="en-US" dirty="0"/>
           </a:p>
@@ -4301,7 +4301,7 @@
             <a:fld id="{B61BEF0D-F0BB-DE4B-95CE-6DB70DBA9567}" type="datetimeFigureOut">
               <a:rPr lang="en-US" dirty="0"/>
               <a:pPr/>
-              <a:t>1/11/21</a:t>
+              <a:t>1/12/21</a:t>
             </a:fld>
             <a:endParaRPr lang="en-US" dirty="0"/>
           </a:p>
@@ -4720,7 +4720,7 @@
             <a:fld id="{B61BEF0D-F0BB-DE4B-95CE-6DB70DBA9567}" type="datetimeFigureOut">
               <a:rPr lang="en-US" dirty="0"/>
               <a:pPr/>
-              <a:t>1/11/21</a:t>
+              <a:t>1/12/21</a:t>
             </a:fld>
             <a:endParaRPr lang="en-US" dirty="0"/>
           </a:p>
@@ -4879,7 +4879,7 @@
             <a:fld id="{B61BEF0D-F0BB-DE4B-95CE-6DB70DBA9567}" type="datetimeFigureOut">
               <a:rPr lang="en-US" dirty="0"/>
               <a:pPr/>
-              <a:t>1/11/21</a:t>
+              <a:t>1/12/21</a:t>
             </a:fld>
             <a:endParaRPr lang="en-US" dirty="0"/>
           </a:p>
@@ -4971,7 +4971,7 @@
             <a:fld id="{B61BEF0D-F0BB-DE4B-95CE-6DB70DBA9567}" type="datetimeFigureOut">
               <a:rPr lang="en-US" dirty="0"/>
               <a:pPr/>
-              <a:t>1/11/21</a:t>
+              <a:t>1/12/21</a:t>
             </a:fld>
             <a:endParaRPr lang="en-US" dirty="0"/>
           </a:p>
@@ -5346,7 +5346,7 @@
             <a:fld id="{B61BEF0D-F0BB-DE4B-95CE-6DB70DBA9567}" type="datetimeFigureOut">
               <a:rPr lang="en-US" dirty="0"/>
               <a:pPr/>
-              <a:t>1/11/21</a:t>
+              <a:t>1/12/21</a:t>
             </a:fld>
             <a:endParaRPr lang="en-US" dirty="0"/>
           </a:p>
@@ -5632,7 +5632,7 @@
             <a:fld id="{B61BEF0D-F0BB-DE4B-95CE-6DB70DBA9567}" type="datetimeFigureOut">
               <a:rPr lang="en-US" dirty="0"/>
               <a:pPr/>
-              <a:t>1/11/21</a:t>
+              <a:t>1/12/21</a:t>
             </a:fld>
             <a:endParaRPr lang="en-US" dirty="0"/>
           </a:p>
@@ -5840,7 +5840,7 @@
             <a:fld id="{B61BEF0D-F0BB-DE4B-95CE-6DB70DBA9567}" type="datetimeFigureOut">
               <a:rPr lang="en-US" dirty="0"/>
               <a:pPr/>
-              <a:t>1/11/21</a:t>
+              <a:t>1/12/21</a:t>
             </a:fld>
             <a:endParaRPr lang="en-US" dirty="0"/>
           </a:p>
@@ -10456,38 +10456,15 @@
                   </a:schemeClr>
                 </a:solidFill>
               </a:rPr>
-              <a:t>Polynomial transformation </a:t>
-            </a:r>
-            <a:r>
-              <a:rPr lang="en-US" sz="2000" dirty="0">
-                <a:solidFill>
-                  <a:schemeClr val="accent2">
-                    <a:lumMod val="50000"/>
-                  </a:schemeClr>
-                </a:solidFill>
-              </a:rPr>
-              <a:t>- </a:t>
-            </a:r>
-            <a:r>
-              <a:rPr lang="en-IL" sz="2000" dirty="0">
-                <a:solidFill>
-                  <a:schemeClr val="accent2">
-                    <a:lumMod val="50000"/>
-                  </a:schemeClr>
-                </a:solidFill>
-              </a:rPr>
-              <a:t>there is clearly a </a:t>
-            </a:r>
-            <a:r>
-              <a:rPr lang="en-US" sz="2000" dirty="0">
-                <a:solidFill>
-                  <a:schemeClr val="accent2">
-                    <a:lumMod val="50000"/>
-                  </a:schemeClr>
-                </a:solidFill>
-              </a:rPr>
-              <a:t>curvilinear relationship between the temperature and the consumption</a:t>
-            </a:r>
+              <a:t>Polynomial transformation</a:t>
+            </a:r>
+            <a:endParaRPr lang="en-US" sz="2000" dirty="0">
+              <a:solidFill>
+                <a:schemeClr val="accent2">
+                  <a:lumMod val="50000"/>
+                </a:schemeClr>
+              </a:solidFill>
+            </a:endParaRPr>
           </a:p>
           <a:p>
             <a:pPr lvl="1"/>
@@ -10499,7 +10476,7 @@
                   </a:schemeClr>
                 </a:solidFill>
               </a:rPr>
-              <a:t>Standard scaler</a:t>
+              <a:t>Robust scaler</a:t>
             </a:r>
             <a:endParaRPr lang="en-IL" sz="2000" b="1" dirty="0">
               <a:solidFill>

</xml_diff>